<commit_message>
Finished (First Draft of) Presentation
Finished the presentation by adding the remaining slides (on SQL statements and the conclusion). This is to be practised and if, through the practice, a part is seen as unnecessary or more is required, then it shall be updated.
</commit_message>
<xml_diff>
--- a/ISAD157 Presentation.pptx
+++ b/ISAD157 Presentation.pptx
@@ -4,6 +4,9 @@
   <p:sldMasterIdLst>
     <p:sldMasterId id="2147483678" r:id="rId1"/>
   </p:sldMasterIdLst>
+  <p:notesMasterIdLst>
+    <p:notesMasterId r:id="rId13"/>
+  </p:notesMasterIdLst>
   <p:sldIdLst>
     <p:sldId id="256" r:id="rId2"/>
     <p:sldId id="257" r:id="rId3"/>
@@ -13,6 +16,9 @@
     <p:sldId id="261" r:id="rId7"/>
     <p:sldId id="262" r:id="rId8"/>
     <p:sldId id="263" r:id="rId9"/>
+    <p:sldId id="264" r:id="rId10"/>
+    <p:sldId id="265" r:id="rId11"/>
+    <p:sldId id="266" r:id="rId12"/>
   </p:sldIdLst>
   <p:sldSz cx="12192000" cy="6858000"/>
   <p:notesSz cx="6858000" cy="9144000"/>
@@ -119,6 +125,470 @@
 </p:presentation>
 </file>
 
+<file path=ppt/notesMasters/notesMaster1.xml><?xml version="1.0" encoding="utf-8"?>
+<p:notesMaster xmlns:a="http://schemas.openxmlformats.org/drawingml/2006/main" xmlns:r="http://schemas.openxmlformats.org/officeDocument/2006/relationships" xmlns:p="http://schemas.openxmlformats.org/presentationml/2006/main">
+  <p:cSld>
+    <p:bg>
+      <p:bgRef idx="1001">
+        <a:schemeClr val="bg1"/>
+      </p:bgRef>
+    </p:bg>
+    <p:spTree>
+      <p:nvGrpSpPr>
+        <p:cNvPr id="1" name=""/>
+        <p:cNvGrpSpPr/>
+        <p:nvPr/>
+      </p:nvGrpSpPr>
+      <p:grpSpPr>
+        <a:xfrm>
+          <a:off x="0" y="0"/>
+          <a:ext cx="0" cy="0"/>
+          <a:chOff x="0" y="0"/>
+          <a:chExt cx="0" cy="0"/>
+        </a:xfrm>
+      </p:grpSpPr>
+      <p:sp>
+        <p:nvSpPr>
+          <p:cNvPr id="2" name="Header Placeholder 1"/>
+          <p:cNvSpPr>
+            <a:spLocks noGrp="1"/>
+          </p:cNvSpPr>
+          <p:nvPr>
+            <p:ph type="hdr" sz="quarter"/>
+          </p:nvPr>
+        </p:nvSpPr>
+        <p:spPr>
+          <a:xfrm>
+            <a:off x="0" y="0"/>
+            <a:ext cx="2971800" cy="458788"/>
+          </a:xfrm>
+          <a:prstGeom prst="rect">
+            <a:avLst/>
+          </a:prstGeom>
+        </p:spPr>
+        <p:txBody>
+          <a:bodyPr vert="horz" lIns="91440" tIns="45720" rIns="91440" bIns="45720" rtlCol="0"/>
+          <a:lstStyle>
+            <a:lvl1pPr algn="l">
+              <a:defRPr sz="1200"/>
+            </a:lvl1pPr>
+          </a:lstStyle>
+          <a:p>
+            <a:endParaRPr lang="en-GB"/>
+          </a:p>
+        </p:txBody>
+      </p:sp>
+      <p:sp>
+        <p:nvSpPr>
+          <p:cNvPr id="3" name="Date Placeholder 2"/>
+          <p:cNvSpPr>
+            <a:spLocks noGrp="1"/>
+          </p:cNvSpPr>
+          <p:nvPr>
+            <p:ph type="dt" idx="1"/>
+          </p:nvPr>
+        </p:nvSpPr>
+        <p:spPr>
+          <a:xfrm>
+            <a:off x="3884613" y="0"/>
+            <a:ext cx="2971800" cy="458788"/>
+          </a:xfrm>
+          <a:prstGeom prst="rect">
+            <a:avLst/>
+          </a:prstGeom>
+        </p:spPr>
+        <p:txBody>
+          <a:bodyPr vert="horz" lIns="91440" tIns="45720" rIns="91440" bIns="45720" rtlCol="0"/>
+          <a:lstStyle>
+            <a:lvl1pPr algn="r">
+              <a:defRPr sz="1200"/>
+            </a:lvl1pPr>
+          </a:lstStyle>
+          <a:p>
+            <a:fld id="{69053C99-FF40-4821-8406-94B6EE439E81}" type="datetimeFigureOut">
+              <a:rPr lang="en-GB" smtClean="0"/>
+              <a:t>18/05/2020</a:t>
+            </a:fld>
+            <a:endParaRPr lang="en-GB"/>
+          </a:p>
+        </p:txBody>
+      </p:sp>
+      <p:sp>
+        <p:nvSpPr>
+          <p:cNvPr id="4" name="Slide Image Placeholder 3"/>
+          <p:cNvSpPr>
+            <a:spLocks noGrp="1" noRot="1" noChangeAspect="1"/>
+          </p:cNvSpPr>
+          <p:nvPr>
+            <p:ph type="sldImg" idx="2"/>
+          </p:nvPr>
+        </p:nvSpPr>
+        <p:spPr>
+          <a:xfrm>
+            <a:off x="685800" y="1143000"/>
+            <a:ext cx="5486400" cy="3086100"/>
+          </a:xfrm>
+          <a:prstGeom prst="rect">
+            <a:avLst/>
+          </a:prstGeom>
+          <a:noFill/>
+          <a:ln w="12700">
+            <a:solidFill>
+              <a:prstClr val="black"/>
+            </a:solidFill>
+          </a:ln>
+        </p:spPr>
+        <p:txBody>
+          <a:bodyPr vert="horz" lIns="91440" tIns="45720" rIns="91440" bIns="45720" rtlCol="0" anchor="ctr"/>
+          <a:lstStyle/>
+          <a:p>
+            <a:endParaRPr lang="en-GB"/>
+          </a:p>
+        </p:txBody>
+      </p:sp>
+      <p:sp>
+        <p:nvSpPr>
+          <p:cNvPr id="5" name="Notes Placeholder 4"/>
+          <p:cNvSpPr>
+            <a:spLocks noGrp="1"/>
+          </p:cNvSpPr>
+          <p:nvPr>
+            <p:ph type="body" sz="quarter" idx="3"/>
+          </p:nvPr>
+        </p:nvSpPr>
+        <p:spPr>
+          <a:xfrm>
+            <a:off x="685800" y="4400550"/>
+            <a:ext cx="5486400" cy="3600450"/>
+          </a:xfrm>
+          <a:prstGeom prst="rect">
+            <a:avLst/>
+          </a:prstGeom>
+        </p:spPr>
+        <p:txBody>
+          <a:bodyPr vert="horz" lIns="91440" tIns="45720" rIns="91440" bIns="45720" rtlCol="0"/>
+          <a:lstStyle/>
+          <a:p>
+            <a:pPr lvl="0"/>
+            <a:r>
+              <a:rPr lang="en-US"/>
+              <a:t>Click to edit Master text styles</a:t>
+            </a:r>
+          </a:p>
+          <a:p>
+            <a:pPr lvl="1"/>
+            <a:r>
+              <a:rPr lang="en-US"/>
+              <a:t>Second level</a:t>
+            </a:r>
+          </a:p>
+          <a:p>
+            <a:pPr lvl="2"/>
+            <a:r>
+              <a:rPr lang="en-US"/>
+              <a:t>Third level</a:t>
+            </a:r>
+          </a:p>
+          <a:p>
+            <a:pPr lvl="3"/>
+            <a:r>
+              <a:rPr lang="en-US"/>
+              <a:t>Fourth level</a:t>
+            </a:r>
+          </a:p>
+          <a:p>
+            <a:pPr lvl="4"/>
+            <a:r>
+              <a:rPr lang="en-US"/>
+              <a:t>Fifth level</a:t>
+            </a:r>
+            <a:endParaRPr lang="en-GB"/>
+          </a:p>
+        </p:txBody>
+      </p:sp>
+      <p:sp>
+        <p:nvSpPr>
+          <p:cNvPr id="6" name="Footer Placeholder 5"/>
+          <p:cNvSpPr>
+            <a:spLocks noGrp="1"/>
+          </p:cNvSpPr>
+          <p:nvPr>
+            <p:ph type="ftr" sz="quarter" idx="4"/>
+          </p:nvPr>
+        </p:nvSpPr>
+        <p:spPr>
+          <a:xfrm>
+            <a:off x="0" y="8685213"/>
+            <a:ext cx="2971800" cy="458787"/>
+          </a:xfrm>
+          <a:prstGeom prst="rect">
+            <a:avLst/>
+          </a:prstGeom>
+        </p:spPr>
+        <p:txBody>
+          <a:bodyPr vert="horz" lIns="91440" tIns="45720" rIns="91440" bIns="45720" rtlCol="0" anchor="b"/>
+          <a:lstStyle>
+            <a:lvl1pPr algn="l">
+              <a:defRPr sz="1200"/>
+            </a:lvl1pPr>
+          </a:lstStyle>
+          <a:p>
+            <a:endParaRPr lang="en-GB"/>
+          </a:p>
+        </p:txBody>
+      </p:sp>
+      <p:sp>
+        <p:nvSpPr>
+          <p:cNvPr id="7" name="Slide Number Placeholder 6"/>
+          <p:cNvSpPr>
+            <a:spLocks noGrp="1"/>
+          </p:cNvSpPr>
+          <p:nvPr>
+            <p:ph type="sldNum" sz="quarter" idx="5"/>
+          </p:nvPr>
+        </p:nvSpPr>
+        <p:spPr>
+          <a:xfrm>
+            <a:off x="3884613" y="8685213"/>
+            <a:ext cx="2971800" cy="458787"/>
+          </a:xfrm>
+          <a:prstGeom prst="rect">
+            <a:avLst/>
+          </a:prstGeom>
+        </p:spPr>
+        <p:txBody>
+          <a:bodyPr vert="horz" lIns="91440" tIns="45720" rIns="91440" bIns="45720" rtlCol="0" anchor="b"/>
+          <a:lstStyle>
+            <a:lvl1pPr algn="r">
+              <a:defRPr sz="1200"/>
+            </a:lvl1pPr>
+          </a:lstStyle>
+          <a:p>
+            <a:fld id="{A6F5174F-1427-4CD3-AA06-DCCA46A03E3F}" type="slidenum">
+              <a:rPr lang="en-GB" smtClean="0"/>
+              <a:t>‹#›</a:t>
+            </a:fld>
+            <a:endParaRPr lang="en-GB"/>
+          </a:p>
+        </p:txBody>
+      </p:sp>
+    </p:spTree>
+    <p:extLst>
+      <p:ext uri="{BB962C8B-B14F-4D97-AF65-F5344CB8AC3E}">
+        <p14:creationId xmlns:p14="http://schemas.microsoft.com/office/powerpoint/2010/main" val="747749772"/>
+      </p:ext>
+    </p:extLst>
+  </p:cSld>
+  <p:clrMap bg1="lt1" tx1="dk1" bg2="lt2" tx2="dk2" accent1="accent1" accent2="accent2" accent3="accent3" accent4="accent4" accent5="accent5" accent6="accent6" hlink="hlink" folHlink="folHlink"/>
+  <p:notesStyle>
+    <a:lvl1pPr marL="0" algn="l" defTabSz="914400" rtl="0" eaLnBrk="1" latinLnBrk="0" hangingPunct="1">
+      <a:defRPr sz="1200" kern="1200">
+        <a:solidFill>
+          <a:schemeClr val="tx1"/>
+        </a:solidFill>
+        <a:latin typeface="+mn-lt"/>
+        <a:ea typeface="+mn-ea"/>
+        <a:cs typeface="+mn-cs"/>
+      </a:defRPr>
+    </a:lvl1pPr>
+    <a:lvl2pPr marL="457200" algn="l" defTabSz="914400" rtl="0" eaLnBrk="1" latinLnBrk="0" hangingPunct="1">
+      <a:defRPr sz="1200" kern="1200">
+        <a:solidFill>
+          <a:schemeClr val="tx1"/>
+        </a:solidFill>
+        <a:latin typeface="+mn-lt"/>
+        <a:ea typeface="+mn-ea"/>
+        <a:cs typeface="+mn-cs"/>
+      </a:defRPr>
+    </a:lvl2pPr>
+    <a:lvl3pPr marL="914400" algn="l" defTabSz="914400" rtl="0" eaLnBrk="1" latinLnBrk="0" hangingPunct="1">
+      <a:defRPr sz="1200" kern="1200">
+        <a:solidFill>
+          <a:schemeClr val="tx1"/>
+        </a:solidFill>
+        <a:latin typeface="+mn-lt"/>
+        <a:ea typeface="+mn-ea"/>
+        <a:cs typeface="+mn-cs"/>
+      </a:defRPr>
+    </a:lvl3pPr>
+    <a:lvl4pPr marL="1371600" algn="l" defTabSz="914400" rtl="0" eaLnBrk="1" latinLnBrk="0" hangingPunct="1">
+      <a:defRPr sz="1200" kern="1200">
+        <a:solidFill>
+          <a:schemeClr val="tx1"/>
+        </a:solidFill>
+        <a:latin typeface="+mn-lt"/>
+        <a:ea typeface="+mn-ea"/>
+        <a:cs typeface="+mn-cs"/>
+      </a:defRPr>
+    </a:lvl4pPr>
+    <a:lvl5pPr marL="1828800" algn="l" defTabSz="914400" rtl="0" eaLnBrk="1" latinLnBrk="0" hangingPunct="1">
+      <a:defRPr sz="1200" kern="1200">
+        <a:solidFill>
+          <a:schemeClr val="tx1"/>
+        </a:solidFill>
+        <a:latin typeface="+mn-lt"/>
+        <a:ea typeface="+mn-ea"/>
+        <a:cs typeface="+mn-cs"/>
+      </a:defRPr>
+    </a:lvl5pPr>
+    <a:lvl6pPr marL="2286000" algn="l" defTabSz="914400" rtl="0" eaLnBrk="1" latinLnBrk="0" hangingPunct="1">
+      <a:defRPr sz="1200" kern="1200">
+        <a:solidFill>
+          <a:schemeClr val="tx1"/>
+        </a:solidFill>
+        <a:latin typeface="+mn-lt"/>
+        <a:ea typeface="+mn-ea"/>
+        <a:cs typeface="+mn-cs"/>
+      </a:defRPr>
+    </a:lvl6pPr>
+    <a:lvl7pPr marL="2743200" algn="l" defTabSz="914400" rtl="0" eaLnBrk="1" latinLnBrk="0" hangingPunct="1">
+      <a:defRPr sz="1200" kern="1200">
+        <a:solidFill>
+          <a:schemeClr val="tx1"/>
+        </a:solidFill>
+        <a:latin typeface="+mn-lt"/>
+        <a:ea typeface="+mn-ea"/>
+        <a:cs typeface="+mn-cs"/>
+      </a:defRPr>
+    </a:lvl7pPr>
+    <a:lvl8pPr marL="3200400" algn="l" defTabSz="914400" rtl="0" eaLnBrk="1" latinLnBrk="0" hangingPunct="1">
+      <a:defRPr sz="1200" kern="1200">
+        <a:solidFill>
+          <a:schemeClr val="tx1"/>
+        </a:solidFill>
+        <a:latin typeface="+mn-lt"/>
+        <a:ea typeface="+mn-ea"/>
+        <a:cs typeface="+mn-cs"/>
+      </a:defRPr>
+    </a:lvl8pPr>
+    <a:lvl9pPr marL="3657600" algn="l" defTabSz="914400" rtl="0" eaLnBrk="1" latinLnBrk="0" hangingPunct="1">
+      <a:defRPr sz="1200" kern="1200">
+        <a:solidFill>
+          <a:schemeClr val="tx1"/>
+        </a:solidFill>
+        <a:latin typeface="+mn-lt"/>
+        <a:ea typeface="+mn-ea"/>
+        <a:cs typeface="+mn-cs"/>
+      </a:defRPr>
+    </a:lvl9pPr>
+  </p:notesStyle>
+</p:notesMaster>
+</file>
+
+<file path=ppt/notesSlides/notesSlide1.xml><?xml version="1.0" encoding="utf-8"?>
+<p:notes xmlns:a="http://schemas.openxmlformats.org/drawingml/2006/main" xmlns:r="http://schemas.openxmlformats.org/officeDocument/2006/relationships" xmlns:p="http://schemas.openxmlformats.org/presentationml/2006/main">
+  <p:cSld>
+    <p:spTree>
+      <p:nvGrpSpPr>
+        <p:cNvPr id="1" name=""/>
+        <p:cNvGrpSpPr/>
+        <p:nvPr/>
+      </p:nvGrpSpPr>
+      <p:grpSpPr>
+        <a:xfrm>
+          <a:off x="0" y="0"/>
+          <a:ext cx="0" cy="0"/>
+          <a:chOff x="0" y="0"/>
+          <a:chExt cx="0" cy="0"/>
+        </a:xfrm>
+      </p:grpSpPr>
+      <p:sp>
+        <p:nvSpPr>
+          <p:cNvPr id="2" name="Slide Image Placeholder 1"/>
+          <p:cNvSpPr>
+            <a:spLocks noGrp="1" noRot="1" noChangeAspect="1"/>
+          </p:cNvSpPr>
+          <p:nvPr>
+            <p:ph type="sldImg"/>
+          </p:nvPr>
+        </p:nvSpPr>
+        <p:spPr/>
+      </p:sp>
+      <p:sp>
+        <p:nvSpPr>
+          <p:cNvPr id="3" name="Notes Placeholder 2"/>
+          <p:cNvSpPr>
+            <a:spLocks noGrp="1"/>
+          </p:cNvSpPr>
+          <p:nvPr>
+            <p:ph type="body" idx="1"/>
+          </p:nvPr>
+        </p:nvSpPr>
+        <p:spPr/>
+        <p:txBody>
+          <a:bodyPr/>
+          <a:lstStyle/>
+          <a:p>
+            <a:pPr marL="0" marR="0" lvl="0" indent="0" algn="l" defTabSz="914400" rtl="0" eaLnBrk="1" fontAlgn="auto" latinLnBrk="0" hangingPunct="1">
+              <a:lnSpc>
+                <a:spcPct val="100000"/>
+              </a:lnSpc>
+              <a:spcBef>
+                <a:spcPts val="0"/>
+              </a:spcBef>
+              <a:spcAft>
+                <a:spcPts val="0"/>
+              </a:spcAft>
+              <a:buClrTx/>
+              <a:buSzTx/>
+              <a:buFontTx/>
+              <a:buNone/>
+              <a:tabLst/>
+              <a:defRPr/>
+            </a:pPr>
+            <a:r>
+              <a:rPr lang="en-GB" sz="1200" kern="1200" dirty="0">
+                <a:solidFill>
+                  <a:schemeClr val="tx1"/>
+                </a:solidFill>
+                <a:latin typeface="+mn-lt"/>
+                <a:ea typeface="+mn-ea"/>
+                <a:cs typeface="+mn-cs"/>
+              </a:rPr>
+              <a:t>Overall, the diagrams that have been drawn are arguably quite clear, but while they may help somewhat with the creation of the code, I’d argue that I saw little connection between them and the coding and database, meaning they didn’t necessarily aid me as much as they could have.</a:t>
+            </a:r>
+          </a:p>
+          <a:p>
+            <a:endParaRPr lang="en-GB" dirty="0"/>
+          </a:p>
+        </p:txBody>
+      </p:sp>
+      <p:sp>
+        <p:nvSpPr>
+          <p:cNvPr id="4" name="Slide Number Placeholder 3"/>
+          <p:cNvSpPr>
+            <a:spLocks noGrp="1"/>
+          </p:cNvSpPr>
+          <p:nvPr>
+            <p:ph type="sldNum" sz="quarter" idx="5"/>
+          </p:nvPr>
+        </p:nvSpPr>
+        <p:spPr/>
+        <p:txBody>
+          <a:bodyPr/>
+          <a:lstStyle/>
+          <a:p>
+            <a:fld id="{A6F5174F-1427-4CD3-AA06-DCCA46A03E3F}" type="slidenum">
+              <a:rPr lang="en-GB" smtClean="0"/>
+              <a:t>11</a:t>
+            </a:fld>
+            <a:endParaRPr lang="en-GB"/>
+          </a:p>
+        </p:txBody>
+      </p:sp>
+    </p:spTree>
+    <p:extLst>
+      <p:ext uri="{BB962C8B-B14F-4D97-AF65-F5344CB8AC3E}">
+        <p14:creationId xmlns:p14="http://schemas.microsoft.com/office/powerpoint/2010/main" val="2659005204"/>
+      </p:ext>
+    </p:extLst>
+  </p:cSld>
+  <p:clrMapOvr>
+    <a:masterClrMapping/>
+  </p:clrMapOvr>
+</p:notes>
+</file>
+
 <file path=ppt/slideLayouts/slideLayout1.xml><?xml version="1.0" encoding="utf-8"?>
 <p:sldLayout xmlns:a="http://schemas.openxmlformats.org/drawingml/2006/main" xmlns:r="http://schemas.openxmlformats.org/officeDocument/2006/relationships" xmlns:p="http://schemas.openxmlformats.org/presentationml/2006/main" type="title" preserve="1">
   <p:cSld name="Title Slide">
@@ -252,7 +722,7 @@
           <a:p>
             <a:fld id="{2336B8E1-41B0-4207-8C6C-B68865C8DFB6}" type="datetimeFigureOut">
               <a:rPr lang="en-GB" smtClean="0"/>
-              <a:t>17/05/2020</a:t>
+              <a:t>18/05/2020</a:t>
             </a:fld>
             <a:endParaRPr lang="en-GB"/>
           </a:p>
@@ -539,7 +1009,7 @@
           <a:p>
             <a:fld id="{2336B8E1-41B0-4207-8C6C-B68865C8DFB6}" type="datetimeFigureOut">
               <a:rPr lang="en-GB" smtClean="0"/>
-              <a:t>17/05/2020</a:t>
+              <a:t>18/05/2020</a:t>
             </a:fld>
             <a:endParaRPr lang="en-GB"/>
           </a:p>
@@ -731,7 +1201,7 @@
           <a:p>
             <a:fld id="{2336B8E1-41B0-4207-8C6C-B68865C8DFB6}" type="datetimeFigureOut">
               <a:rPr lang="en-GB" smtClean="0"/>
-              <a:t>17/05/2020</a:t>
+              <a:t>18/05/2020</a:t>
             </a:fld>
             <a:endParaRPr lang="en-GB"/>
           </a:p>
@@ -992,7 +1462,7 @@
           <a:p>
             <a:fld id="{2336B8E1-41B0-4207-8C6C-B68865C8DFB6}" type="datetimeFigureOut">
               <a:rPr lang="en-GB" smtClean="0"/>
-              <a:t>17/05/2020</a:t>
+              <a:t>18/05/2020</a:t>
             </a:fld>
             <a:endParaRPr lang="en-GB"/>
           </a:p>
@@ -1416,7 +1886,7 @@
           <a:p>
             <a:fld id="{2336B8E1-41B0-4207-8C6C-B68865C8DFB6}" type="datetimeFigureOut">
               <a:rPr lang="en-GB" smtClean="0"/>
-              <a:t>17/05/2020</a:t>
+              <a:t>18/05/2020</a:t>
             </a:fld>
             <a:endParaRPr lang="en-GB"/>
           </a:p>
@@ -1962,7 +2432,7 @@
           <a:p>
             <a:fld id="{2336B8E1-41B0-4207-8C6C-B68865C8DFB6}" type="datetimeFigureOut">
               <a:rPr lang="en-GB" smtClean="0"/>
-              <a:t>17/05/2020</a:t>
+              <a:t>18/05/2020</a:t>
             </a:fld>
             <a:endParaRPr lang="en-GB"/>
           </a:p>
@@ -2802,7 +3272,7 @@
           <a:p>
             <a:fld id="{2336B8E1-41B0-4207-8C6C-B68865C8DFB6}" type="datetimeFigureOut">
               <a:rPr lang="en-GB" smtClean="0"/>
-              <a:t>17/05/2020</a:t>
+              <a:t>18/05/2020</a:t>
             </a:fld>
             <a:endParaRPr lang="en-GB"/>
           </a:p>
@@ -2972,7 +3442,7 @@
           <a:p>
             <a:fld id="{2336B8E1-41B0-4207-8C6C-B68865C8DFB6}" type="datetimeFigureOut">
               <a:rPr lang="en-GB" smtClean="0"/>
-              <a:t>17/05/2020</a:t>
+              <a:t>18/05/2020</a:t>
             </a:fld>
             <a:endParaRPr lang="en-GB"/>
           </a:p>
@@ -3156,7 +3626,7 @@
           <a:p>
             <a:fld id="{2336B8E1-41B0-4207-8C6C-B68865C8DFB6}" type="datetimeFigureOut">
               <a:rPr lang="en-GB" smtClean="0"/>
-              <a:t>17/05/2020</a:t>
+              <a:t>18/05/2020</a:t>
             </a:fld>
             <a:endParaRPr lang="en-GB"/>
           </a:p>
@@ -3326,7 +3796,7 @@
           <a:p>
             <a:fld id="{2336B8E1-41B0-4207-8C6C-B68865C8DFB6}" type="datetimeFigureOut">
               <a:rPr lang="en-GB" smtClean="0"/>
-              <a:t>17/05/2020</a:t>
+              <a:t>18/05/2020</a:t>
             </a:fld>
             <a:endParaRPr lang="en-GB"/>
           </a:p>
@@ -3574,7 +4044,7 @@
           <a:p>
             <a:fld id="{2336B8E1-41B0-4207-8C6C-B68865C8DFB6}" type="datetimeFigureOut">
               <a:rPr lang="en-GB" smtClean="0"/>
-              <a:t>17/05/2020</a:t>
+              <a:t>18/05/2020</a:t>
             </a:fld>
             <a:endParaRPr lang="en-GB"/>
           </a:p>
@@ -3811,7 +4281,7 @@
           <a:p>
             <a:fld id="{2336B8E1-41B0-4207-8C6C-B68865C8DFB6}" type="datetimeFigureOut">
               <a:rPr lang="en-GB" smtClean="0"/>
-              <a:t>17/05/2020</a:t>
+              <a:t>18/05/2020</a:t>
             </a:fld>
             <a:endParaRPr lang="en-GB"/>
           </a:p>
@@ -4184,7 +4654,7 @@
           <a:p>
             <a:fld id="{2336B8E1-41B0-4207-8C6C-B68865C8DFB6}" type="datetimeFigureOut">
               <a:rPr lang="en-GB" smtClean="0"/>
-              <a:t>17/05/2020</a:t>
+              <a:t>18/05/2020</a:t>
             </a:fld>
             <a:endParaRPr lang="en-GB"/>
           </a:p>
@@ -4302,7 +4772,7 @@
           <a:p>
             <a:fld id="{2336B8E1-41B0-4207-8C6C-B68865C8DFB6}" type="datetimeFigureOut">
               <a:rPr lang="en-GB" smtClean="0"/>
-              <a:t>17/05/2020</a:t>
+              <a:t>18/05/2020</a:t>
             </a:fld>
             <a:endParaRPr lang="en-GB"/>
           </a:p>
@@ -4397,7 +4867,7 @@
           <a:p>
             <a:fld id="{2336B8E1-41B0-4207-8C6C-B68865C8DFB6}" type="datetimeFigureOut">
               <a:rPr lang="en-GB" smtClean="0"/>
-              <a:t>17/05/2020</a:t>
+              <a:t>18/05/2020</a:t>
             </a:fld>
             <a:endParaRPr lang="en-GB"/>
           </a:p>
@@ -4648,7 +5118,7 @@
           <a:p>
             <a:fld id="{2336B8E1-41B0-4207-8C6C-B68865C8DFB6}" type="datetimeFigureOut">
               <a:rPr lang="en-GB" smtClean="0"/>
-              <a:t>17/05/2020</a:t>
+              <a:t>18/05/2020</a:t>
             </a:fld>
             <a:endParaRPr lang="en-GB"/>
           </a:p>
@@ -4935,7 +5405,7 @@
           <a:p>
             <a:fld id="{2336B8E1-41B0-4207-8C6C-B68865C8DFB6}" type="datetimeFigureOut">
               <a:rPr lang="en-GB" smtClean="0"/>
-              <a:t>17/05/2020</a:t>
+              <a:t>18/05/2020</a:t>
             </a:fld>
             <a:endParaRPr lang="en-GB"/>
           </a:p>
@@ -5148,7 +5618,7 @@
           <a:p>
             <a:fld id="{2336B8E1-41B0-4207-8C6C-B68865C8DFB6}" type="datetimeFigureOut">
               <a:rPr lang="en-GB" smtClean="0"/>
-              <a:t>17/05/2020</a:t>
+              <a:t>18/05/2020</a:t>
             </a:fld>
             <a:endParaRPr lang="en-GB"/>
           </a:p>
@@ -5702,6 +6172,549 @@
 </p:sld>
 </file>
 
+<file path=ppt/slides/slide10.xml><?xml version="1.0" encoding="utf-8"?>
+<p:sld xmlns:a="http://schemas.openxmlformats.org/drawingml/2006/main" xmlns:r="http://schemas.openxmlformats.org/officeDocument/2006/relationships" xmlns:p="http://schemas.openxmlformats.org/presentationml/2006/main">
+  <p:cSld>
+    <p:bg>
+      <p:bgPr>
+        <a:blipFill rotWithShape="1">
+          <a:blip r:embed="rId2">
+            <a:duotone>
+              <a:schemeClr val="bg2">
+                <a:shade val="18000"/>
+                <a:satMod val="160000"/>
+                <a:lumMod val="28000"/>
+              </a:schemeClr>
+              <a:schemeClr val="bg2">
+                <a:tint val="95000"/>
+                <a:satMod val="160000"/>
+                <a:lumMod val="116000"/>
+              </a:schemeClr>
+            </a:duotone>
+          </a:blip>
+          <a:stretch/>
+        </a:blipFill>
+        <a:effectLst/>
+      </p:bgPr>
+    </p:bg>
+    <p:spTree>
+      <p:nvGrpSpPr>
+        <p:cNvPr id="1" name=""/>
+        <p:cNvGrpSpPr/>
+        <p:nvPr/>
+      </p:nvGrpSpPr>
+      <p:grpSpPr>
+        <a:xfrm>
+          <a:off x="0" y="0"/>
+          <a:ext cx="0" cy="0"/>
+          <a:chOff x="0" y="0"/>
+          <a:chExt cx="0" cy="0"/>
+        </a:xfrm>
+      </p:grpSpPr>
+      <p:sp useBgFill="1">
+        <p:nvSpPr>
+          <p:cNvPr id="8" name="Rectangle 7">
+            <a:extLst>
+              <a:ext uri="{FF2B5EF4-FFF2-40B4-BE49-F238E27FC236}">
+                <a16:creationId xmlns:a16="http://schemas.microsoft.com/office/drawing/2014/main" id="{BC052280-388E-4151-A1EB-5236D4FCCA28}"/>
+              </a:ext>
+              <a:ext uri="{C183D7F6-B498-43B3-948B-1728B52AA6E4}">
+                <adec:decorative xmlns:adec="http://schemas.microsoft.com/office/drawing/2017/decorative" val="1"/>
+              </a:ext>
+            </a:extLst>
+          </p:cNvPr>
+          <p:cNvSpPr>
+            <a:spLocks noGrp="1" noRot="1" noChangeAspect="1" noMove="1" noResize="1" noEditPoints="1" noAdjustHandles="1" noChangeArrowheads="1" noChangeShapeType="1" noTextEdit="1"/>
+          </p:cNvSpPr>
+          <p:nvPr>
+            <p:extLst>
+              <p:ext uri="{386F3935-93C4-4BCD-93E2-E3B085C9AB24}">
+                <p16:designElem xmlns:p16="http://schemas.microsoft.com/office/powerpoint/2015/main" val="1"/>
+              </p:ext>
+            </p:extLst>
+          </p:nvPr>
+        </p:nvSpPr>
+        <p:spPr>
+          <a:xfrm>
+            <a:off x="0" y="0"/>
+            <a:ext cx="12192000" cy="6858000"/>
+          </a:xfrm>
+          <a:prstGeom prst="rect">
+            <a:avLst/>
+          </a:prstGeom>
+          <a:ln>
+            <a:noFill/>
+          </a:ln>
+        </p:spPr>
+        <p:style>
+          <a:lnRef idx="2">
+            <a:schemeClr val="accent1">
+              <a:shade val="50000"/>
+            </a:schemeClr>
+          </a:lnRef>
+          <a:fillRef idx="1">
+            <a:schemeClr val="accent1"/>
+          </a:fillRef>
+          <a:effectRef idx="0">
+            <a:schemeClr val="accent1"/>
+          </a:effectRef>
+          <a:fontRef idx="minor">
+            <a:schemeClr val="lt1"/>
+          </a:fontRef>
+        </p:style>
+        <p:txBody>
+          <a:bodyPr rtlCol="0" anchor="ctr"/>
+          <a:lstStyle/>
+          <a:p>
+            <a:pPr algn="ctr"/>
+            <a:endParaRPr lang="en-US"/>
+          </a:p>
+        </p:txBody>
+      </p:sp>
+      <p:sp>
+        <p:nvSpPr>
+          <p:cNvPr id="2" name="Title 1">
+            <a:extLst>
+              <a:ext uri="{FF2B5EF4-FFF2-40B4-BE49-F238E27FC236}">
+                <a16:creationId xmlns:a16="http://schemas.microsoft.com/office/drawing/2014/main" id="{86303964-F6FE-4868-9CC2-074D1EF77090}"/>
+              </a:ext>
+            </a:extLst>
+          </p:cNvPr>
+          <p:cNvSpPr>
+            <a:spLocks noGrp="1"/>
+          </p:cNvSpPr>
+          <p:nvPr>
+            <p:ph type="title"/>
+          </p:nvPr>
+        </p:nvSpPr>
+        <p:spPr>
+          <a:xfrm>
+            <a:off x="913796" y="927100"/>
+            <a:ext cx="3418766" cy="4616450"/>
+          </a:xfrm>
+        </p:spPr>
+        <p:txBody>
+          <a:bodyPr>
+            <a:normAutofit/>
+          </a:bodyPr>
+          <a:lstStyle/>
+          <a:p>
+            <a:r>
+              <a:rPr lang="en-GB" dirty="0"/>
+              <a:t>SQL Queries 3</a:t>
+            </a:r>
+          </a:p>
+        </p:txBody>
+      </p:sp>
+      <p:cxnSp>
+        <p:nvCxnSpPr>
+          <p:cNvPr id="10" name="Straight Connector 9">
+            <a:extLst>
+              <a:ext uri="{FF2B5EF4-FFF2-40B4-BE49-F238E27FC236}">
+                <a16:creationId xmlns:a16="http://schemas.microsoft.com/office/drawing/2014/main" id="{744251C3-E720-4363-8AF0-20AD319374F0}"/>
+              </a:ext>
+              <a:ext uri="{C183D7F6-B498-43B3-948B-1728B52AA6E4}">
+                <adec:decorative xmlns:adec="http://schemas.microsoft.com/office/drawing/2017/decorative" val="1"/>
+              </a:ext>
+            </a:extLst>
+          </p:cNvPr>
+          <p:cNvCxnSpPr>
+            <a:cxnSpLocks noGrp="1" noRot="1" noChangeAspect="1" noMove="1" noResize="1" noEditPoints="1" noAdjustHandles="1" noChangeArrowheads="1" noChangeShapeType="1"/>
+          </p:cNvCxnSpPr>
+          <p:nvPr>
+            <p:extLst>
+              <p:ext uri="{386F3935-93C4-4BCD-93E2-E3B085C9AB24}">
+                <p16:designElem xmlns:p16="http://schemas.microsoft.com/office/powerpoint/2015/main" val="1"/>
+              </p:ext>
+            </p:extLst>
+          </p:nvPr>
+        </p:nvCxnSpPr>
+        <p:spPr>
+          <a:xfrm>
+            <a:off x="4654296" y="2301359"/>
+            <a:ext cx="0" cy="1911350"/>
+          </a:xfrm>
+          <a:prstGeom prst="line">
+            <a:avLst/>
+          </a:prstGeom>
+          <a:ln>
+            <a:solidFill>
+              <a:schemeClr val="tx2"/>
+            </a:solidFill>
+          </a:ln>
+        </p:spPr>
+        <p:style>
+          <a:lnRef idx="1">
+            <a:schemeClr val="accent1"/>
+          </a:lnRef>
+          <a:fillRef idx="0">
+            <a:schemeClr val="accent1"/>
+          </a:fillRef>
+          <a:effectRef idx="0">
+            <a:schemeClr val="accent1"/>
+          </a:effectRef>
+          <a:fontRef idx="minor">
+            <a:schemeClr val="tx1"/>
+          </a:fontRef>
+        </p:style>
+      </p:cxnSp>
+      <p:sp>
+        <p:nvSpPr>
+          <p:cNvPr id="3" name="Content Placeholder 2">
+            <a:extLst>
+              <a:ext uri="{FF2B5EF4-FFF2-40B4-BE49-F238E27FC236}">
+                <a16:creationId xmlns:a16="http://schemas.microsoft.com/office/drawing/2014/main" id="{DC900C16-142C-4B16-82BF-214B435B784E}"/>
+              </a:ext>
+            </a:extLst>
+          </p:cNvPr>
+          <p:cNvSpPr>
+            <a:spLocks noGrp="1"/>
+          </p:cNvSpPr>
+          <p:nvPr>
+            <p:ph idx="1"/>
+          </p:nvPr>
+        </p:nvSpPr>
+        <p:spPr>
+          <a:xfrm>
+            <a:off x="4976029" y="971549"/>
+            <a:ext cx="6291528" cy="4616450"/>
+          </a:xfrm>
+        </p:spPr>
+        <p:txBody>
+          <a:bodyPr anchor="ctr">
+            <a:normAutofit/>
+          </a:bodyPr>
+          <a:lstStyle/>
+          <a:p>
+            <a:pPr>
+              <a:lnSpc>
+                <a:spcPct val="110000"/>
+              </a:lnSpc>
+            </a:pPr>
+            <a:r>
+              <a:rPr lang="en-GB" sz="1600" dirty="0">
+                <a:latin typeface="+mj-lt"/>
+              </a:rPr>
+              <a:t>The Messages table is used to store all the messages between users. This table is the only one in the database to have two foreign keys (these being the “</a:t>
+            </a:r>
+            <a:r>
+              <a:rPr lang="en-GB" sz="1600" dirty="0" err="1">
+                <a:latin typeface="+mj-lt"/>
+              </a:rPr>
+              <a:t>sender_id</a:t>
+            </a:r>
+            <a:r>
+              <a:rPr lang="en-GB" sz="1600" dirty="0">
+                <a:latin typeface="+mj-lt"/>
+              </a:rPr>
+              <a:t>” and “</a:t>
+            </a:r>
+            <a:r>
+              <a:rPr lang="en-GB" sz="1600" dirty="0" err="1">
+                <a:latin typeface="+mj-lt"/>
+              </a:rPr>
+              <a:t>receiver_id</a:t>
+            </a:r>
+            <a:r>
+              <a:rPr lang="en-GB" sz="1600" dirty="0">
+                <a:latin typeface="+mj-lt"/>
+              </a:rPr>
+              <a:t>” respectively). Both the sender and receiver were related to the user as they are both users themselves. Hence, there are technically two connections between the Messages and Users tables. This table is also the only one to contain a different datatype to VARCHAR: DATETIME. This was (obviously) applied to the “</a:t>
+            </a:r>
+            <a:r>
+              <a:rPr lang="en-GB" sz="1600" dirty="0" err="1">
+                <a:latin typeface="+mj-lt"/>
+              </a:rPr>
+              <a:t>date_and_time_sent</a:t>
+            </a:r>
+            <a:r>
+              <a:rPr lang="en-GB" sz="1600" dirty="0">
+                <a:latin typeface="+mj-lt"/>
+              </a:rPr>
+              <a:t>” attribute simply as it fits there perfectly, considering its use for the date and time together. </a:t>
+            </a:r>
+          </a:p>
+          <a:p>
+            <a:pPr>
+              <a:lnSpc>
+                <a:spcPct val="110000"/>
+              </a:lnSpc>
+            </a:pPr>
+            <a:r>
+              <a:rPr lang="en-GB" sz="1600" dirty="0">
+                <a:latin typeface="+mj-lt"/>
+              </a:rPr>
+              <a:t>SELECT statements are the only other SQL queries to not have been directly used in other tables. They are contained within the C# code for the visual interface as literal (hard-coded) values, enabling the C# code to execute the statements (to access the tables) itself.</a:t>
+            </a:r>
+          </a:p>
+        </p:txBody>
+      </p:sp>
+    </p:spTree>
+    <p:extLst>
+      <p:ext uri="{BB962C8B-B14F-4D97-AF65-F5344CB8AC3E}">
+        <p14:creationId xmlns:p14="http://schemas.microsoft.com/office/powerpoint/2010/main" val="3388391856"/>
+      </p:ext>
+    </p:extLst>
+  </p:cSld>
+  <p:clrMapOvr>
+    <a:masterClrMapping/>
+  </p:clrMapOvr>
+</p:sld>
+</file>
+
+<file path=ppt/slides/slide11.xml><?xml version="1.0" encoding="utf-8"?>
+<p:sld xmlns:a="http://schemas.openxmlformats.org/drawingml/2006/main" xmlns:r="http://schemas.openxmlformats.org/officeDocument/2006/relationships" xmlns:p="http://schemas.openxmlformats.org/presentationml/2006/main">
+  <p:cSld>
+    <p:bg>
+      <p:bgPr>
+        <a:blipFill rotWithShape="1">
+          <a:blip r:embed="rId3">
+            <a:duotone>
+              <a:schemeClr val="bg2">
+                <a:shade val="18000"/>
+                <a:satMod val="160000"/>
+                <a:lumMod val="28000"/>
+              </a:schemeClr>
+              <a:schemeClr val="bg2">
+                <a:tint val="95000"/>
+                <a:satMod val="160000"/>
+                <a:lumMod val="116000"/>
+              </a:schemeClr>
+            </a:duotone>
+          </a:blip>
+          <a:stretch/>
+        </a:blipFill>
+        <a:effectLst/>
+      </p:bgPr>
+    </p:bg>
+    <p:spTree>
+      <p:nvGrpSpPr>
+        <p:cNvPr id="1" name=""/>
+        <p:cNvGrpSpPr/>
+        <p:nvPr/>
+      </p:nvGrpSpPr>
+      <p:grpSpPr>
+        <a:xfrm>
+          <a:off x="0" y="0"/>
+          <a:ext cx="0" cy="0"/>
+          <a:chOff x="0" y="0"/>
+          <a:chExt cx="0" cy="0"/>
+        </a:xfrm>
+      </p:grpSpPr>
+      <p:sp useBgFill="1">
+        <p:nvSpPr>
+          <p:cNvPr id="8" name="Rectangle 7">
+            <a:extLst>
+              <a:ext uri="{FF2B5EF4-FFF2-40B4-BE49-F238E27FC236}">
+                <a16:creationId xmlns:a16="http://schemas.microsoft.com/office/drawing/2014/main" id="{BC052280-388E-4151-A1EB-5236D4FCCA28}"/>
+              </a:ext>
+              <a:ext uri="{C183D7F6-B498-43B3-948B-1728B52AA6E4}">
+                <adec:decorative xmlns:adec="http://schemas.microsoft.com/office/drawing/2017/decorative" val="1"/>
+              </a:ext>
+            </a:extLst>
+          </p:cNvPr>
+          <p:cNvSpPr>
+            <a:spLocks noGrp="1" noRot="1" noChangeAspect="1" noMove="1" noResize="1" noEditPoints="1" noAdjustHandles="1" noChangeArrowheads="1" noChangeShapeType="1" noTextEdit="1"/>
+          </p:cNvSpPr>
+          <p:nvPr>
+            <p:extLst>
+              <p:ext uri="{386F3935-93C4-4BCD-93E2-E3B085C9AB24}">
+                <p16:designElem xmlns:p16="http://schemas.microsoft.com/office/powerpoint/2015/main" val="1"/>
+              </p:ext>
+            </p:extLst>
+          </p:nvPr>
+        </p:nvSpPr>
+        <p:spPr>
+          <a:xfrm>
+            <a:off x="0" y="0"/>
+            <a:ext cx="12192000" cy="6858000"/>
+          </a:xfrm>
+          <a:prstGeom prst="rect">
+            <a:avLst/>
+          </a:prstGeom>
+          <a:ln>
+            <a:noFill/>
+          </a:ln>
+        </p:spPr>
+        <p:style>
+          <a:lnRef idx="2">
+            <a:schemeClr val="accent1">
+              <a:shade val="50000"/>
+            </a:schemeClr>
+          </a:lnRef>
+          <a:fillRef idx="1">
+            <a:schemeClr val="accent1"/>
+          </a:fillRef>
+          <a:effectRef idx="0">
+            <a:schemeClr val="accent1"/>
+          </a:effectRef>
+          <a:fontRef idx="minor">
+            <a:schemeClr val="lt1"/>
+          </a:fontRef>
+        </p:style>
+        <p:txBody>
+          <a:bodyPr rtlCol="0" anchor="ctr"/>
+          <a:lstStyle/>
+          <a:p>
+            <a:pPr algn="ctr"/>
+            <a:endParaRPr lang="en-US"/>
+          </a:p>
+        </p:txBody>
+      </p:sp>
+      <p:sp>
+        <p:nvSpPr>
+          <p:cNvPr id="2" name="Title 1">
+            <a:extLst>
+              <a:ext uri="{FF2B5EF4-FFF2-40B4-BE49-F238E27FC236}">
+                <a16:creationId xmlns:a16="http://schemas.microsoft.com/office/drawing/2014/main" id="{86303964-F6FE-4868-9CC2-074D1EF77090}"/>
+              </a:ext>
+            </a:extLst>
+          </p:cNvPr>
+          <p:cNvSpPr>
+            <a:spLocks noGrp="1"/>
+          </p:cNvSpPr>
+          <p:nvPr>
+            <p:ph type="title"/>
+          </p:nvPr>
+        </p:nvSpPr>
+        <p:spPr>
+          <a:xfrm>
+            <a:off x="913796" y="927100"/>
+            <a:ext cx="3418766" cy="4616450"/>
+          </a:xfrm>
+        </p:spPr>
+        <p:txBody>
+          <a:bodyPr>
+            <a:normAutofit/>
+          </a:bodyPr>
+          <a:lstStyle/>
+          <a:p>
+            <a:r>
+              <a:rPr lang="en-GB" dirty="0"/>
+              <a:t>Conclusion</a:t>
+            </a:r>
+          </a:p>
+        </p:txBody>
+      </p:sp>
+      <p:cxnSp>
+        <p:nvCxnSpPr>
+          <p:cNvPr id="10" name="Straight Connector 9">
+            <a:extLst>
+              <a:ext uri="{FF2B5EF4-FFF2-40B4-BE49-F238E27FC236}">
+                <a16:creationId xmlns:a16="http://schemas.microsoft.com/office/drawing/2014/main" id="{744251C3-E720-4363-8AF0-20AD319374F0}"/>
+              </a:ext>
+              <a:ext uri="{C183D7F6-B498-43B3-948B-1728B52AA6E4}">
+                <adec:decorative xmlns:adec="http://schemas.microsoft.com/office/drawing/2017/decorative" val="1"/>
+              </a:ext>
+            </a:extLst>
+          </p:cNvPr>
+          <p:cNvCxnSpPr>
+            <a:cxnSpLocks noGrp="1" noRot="1" noChangeAspect="1" noMove="1" noResize="1" noEditPoints="1" noAdjustHandles="1" noChangeArrowheads="1" noChangeShapeType="1"/>
+          </p:cNvCxnSpPr>
+          <p:nvPr>
+            <p:extLst>
+              <p:ext uri="{386F3935-93C4-4BCD-93E2-E3B085C9AB24}">
+                <p16:designElem xmlns:p16="http://schemas.microsoft.com/office/powerpoint/2015/main" val="1"/>
+              </p:ext>
+            </p:extLst>
+          </p:nvPr>
+        </p:nvCxnSpPr>
+        <p:spPr>
+          <a:xfrm>
+            <a:off x="4654296" y="2301359"/>
+            <a:ext cx="0" cy="1911350"/>
+          </a:xfrm>
+          <a:prstGeom prst="line">
+            <a:avLst/>
+          </a:prstGeom>
+          <a:ln>
+            <a:solidFill>
+              <a:schemeClr val="tx2"/>
+            </a:solidFill>
+          </a:ln>
+        </p:spPr>
+        <p:style>
+          <a:lnRef idx="1">
+            <a:schemeClr val="accent1"/>
+          </a:lnRef>
+          <a:fillRef idx="0">
+            <a:schemeClr val="accent1"/>
+          </a:fillRef>
+          <a:effectRef idx="0">
+            <a:schemeClr val="accent1"/>
+          </a:effectRef>
+          <a:fontRef idx="minor">
+            <a:schemeClr val="tx1"/>
+          </a:fontRef>
+        </p:style>
+      </p:cxnSp>
+      <p:sp>
+        <p:nvSpPr>
+          <p:cNvPr id="3" name="Content Placeholder 2">
+            <a:extLst>
+              <a:ext uri="{FF2B5EF4-FFF2-40B4-BE49-F238E27FC236}">
+                <a16:creationId xmlns:a16="http://schemas.microsoft.com/office/drawing/2014/main" id="{DC900C16-142C-4B16-82BF-214B435B784E}"/>
+              </a:ext>
+            </a:extLst>
+          </p:cNvPr>
+          <p:cNvSpPr>
+            <a:spLocks noGrp="1"/>
+          </p:cNvSpPr>
+          <p:nvPr>
+            <p:ph idx="1"/>
+          </p:nvPr>
+        </p:nvSpPr>
+        <p:spPr>
+          <a:xfrm>
+            <a:off x="4976029" y="971549"/>
+            <a:ext cx="6291528" cy="4616450"/>
+          </a:xfrm>
+        </p:spPr>
+        <p:txBody>
+          <a:bodyPr anchor="ctr">
+            <a:normAutofit/>
+          </a:bodyPr>
+          <a:lstStyle/>
+          <a:p>
+            <a:pPr>
+              <a:lnSpc>
+                <a:spcPct val="110000"/>
+              </a:lnSpc>
+            </a:pPr>
+            <a:r>
+              <a:rPr lang="en-GB" sz="1600" dirty="0">
+                <a:latin typeface="+mj-lt"/>
+              </a:rPr>
+              <a:t>Overall, the diagrams that have been drawn are arguably quite clear and describe the users’ levels of access and roles when using the database. Although the diagrams seem sufficient (at least to me), the C# code could arguably have been improved; it only displays the data from the database simply in separate tables where, ideally, it would have had a link between each table (and specific data within each) depending on which attribute the user selected (for example, (starting with the User-Friend Link table) displaying the a particular profile from the Users table having selected a particular “</a:t>
+            </a:r>
+            <a:r>
+              <a:rPr lang="en-GB" sz="1600" dirty="0" err="1">
+                <a:latin typeface="+mj-lt"/>
+              </a:rPr>
+              <a:t>user_id</a:t>
+            </a:r>
+            <a:r>
+              <a:rPr lang="en-GB" sz="1600" dirty="0">
+                <a:latin typeface="+mj-lt"/>
+              </a:rPr>
+              <a:t>”).</a:t>
+            </a:r>
+          </a:p>
+        </p:txBody>
+      </p:sp>
+    </p:spTree>
+    <p:extLst>
+      <p:ext uri="{BB962C8B-B14F-4D97-AF65-F5344CB8AC3E}">
+        <p14:creationId xmlns:p14="http://schemas.microsoft.com/office/powerpoint/2010/main" val="2844396003"/>
+      </p:ext>
+    </p:extLst>
+  </p:cSld>
+  <p:clrMapOvr>
+    <a:masterClrMapping/>
+  </p:clrMapOvr>
+</p:sld>
+</file>
+
 <file path=ppt/slides/slide2.xml><?xml version="1.0" encoding="utf-8"?>
 <p:sld xmlns:a="http://schemas.openxmlformats.org/drawingml/2006/main" xmlns:r="http://schemas.openxmlformats.org/officeDocument/2006/relationships" xmlns:p="http://schemas.openxmlformats.org/presentationml/2006/main">
   <p:cSld>
@@ -7431,7 +8444,7 @@
         </p:spPr>
         <p:txBody>
           <a:bodyPr anchor="ctr">
-            <a:normAutofit/>
+            <a:normAutofit fontScale="92500" lnSpcReduction="20000"/>
           </a:bodyPr>
           <a:lstStyle/>
           <a:p>
@@ -7440,9 +8453,25 @@
                 <a:spcPct val="110000"/>
               </a:lnSpc>
             </a:pPr>
-            <a:endParaRPr lang="en-GB" sz="1600" dirty="0">
-              <a:latin typeface="+mj-lt"/>
-            </a:endParaRPr>
+            <a:r>
+              <a:rPr lang="en-GB" sz="1600" dirty="0">
+                <a:latin typeface="+mj-lt"/>
+              </a:rPr>
+              <a:t>The Users table is a table that contains a Facebook user’s personal details other than the university and/or workplace they attend(ed). This includes forename, surname, hometown, and gender. The table was rather simple to create (especially compared to the others) as it required no foreign keys and only contains the VARCHAR datatype. </a:t>
+            </a:r>
+          </a:p>
+          <a:p>
+            <a:pPr>
+              <a:lnSpc>
+                <a:spcPct val="110000"/>
+              </a:lnSpc>
+            </a:pPr>
+            <a:r>
+              <a:rPr lang="en-GB" sz="1600" dirty="0">
+                <a:latin typeface="+mj-lt"/>
+              </a:rPr>
+              <a:t>The Workplaces table contains users’ workplace information that was deliberately separated from the Users table. This was because of the Normalisation; the date range during which any particular user attended any particular workplace is defined both by the user and the workplace (as different people work for different amounts of time and at different times) and hence this would form a separate table with a composite key. Datatype-wise, it too only contains VARCHARs. VARCHARs are incredibly versatile datatypes, able to represent most data. The DATE type was intended to be used for the date field, but because it was a range (and not a single date), it wouldn’t work unless it was made into two separate columns. Wanting to keep to the source profile as much as possible, the column was not split and hence the VARCHAR was used instead.</a:t>
+            </a:r>
           </a:p>
         </p:txBody>
       </p:sp>
@@ -7450,6 +8479,272 @@
     <p:extLst>
       <p:ext uri="{BB962C8B-B14F-4D97-AF65-F5344CB8AC3E}">
         <p14:creationId xmlns:p14="http://schemas.microsoft.com/office/powerpoint/2010/main" val="4136533379"/>
+      </p:ext>
+    </p:extLst>
+  </p:cSld>
+  <p:clrMapOvr>
+    <a:masterClrMapping/>
+  </p:clrMapOvr>
+</p:sld>
+</file>
+
+<file path=ppt/slides/slide9.xml><?xml version="1.0" encoding="utf-8"?>
+<p:sld xmlns:a="http://schemas.openxmlformats.org/drawingml/2006/main" xmlns:r="http://schemas.openxmlformats.org/officeDocument/2006/relationships" xmlns:p="http://schemas.openxmlformats.org/presentationml/2006/main">
+  <p:cSld>
+    <p:bg>
+      <p:bgPr>
+        <a:blipFill rotWithShape="1">
+          <a:blip r:embed="rId2">
+            <a:duotone>
+              <a:schemeClr val="bg2">
+                <a:shade val="18000"/>
+                <a:satMod val="160000"/>
+                <a:lumMod val="28000"/>
+              </a:schemeClr>
+              <a:schemeClr val="bg2">
+                <a:tint val="95000"/>
+                <a:satMod val="160000"/>
+                <a:lumMod val="116000"/>
+              </a:schemeClr>
+            </a:duotone>
+          </a:blip>
+          <a:stretch/>
+        </a:blipFill>
+        <a:effectLst/>
+      </p:bgPr>
+    </p:bg>
+    <p:spTree>
+      <p:nvGrpSpPr>
+        <p:cNvPr id="1" name=""/>
+        <p:cNvGrpSpPr/>
+        <p:nvPr/>
+      </p:nvGrpSpPr>
+      <p:grpSpPr>
+        <a:xfrm>
+          <a:off x="0" y="0"/>
+          <a:ext cx="0" cy="0"/>
+          <a:chOff x="0" y="0"/>
+          <a:chExt cx="0" cy="0"/>
+        </a:xfrm>
+      </p:grpSpPr>
+      <p:sp useBgFill="1">
+        <p:nvSpPr>
+          <p:cNvPr id="8" name="Rectangle 7">
+            <a:extLst>
+              <a:ext uri="{FF2B5EF4-FFF2-40B4-BE49-F238E27FC236}">
+                <a16:creationId xmlns:a16="http://schemas.microsoft.com/office/drawing/2014/main" id="{BC052280-388E-4151-A1EB-5236D4FCCA28}"/>
+              </a:ext>
+              <a:ext uri="{C183D7F6-B498-43B3-948B-1728B52AA6E4}">
+                <adec:decorative xmlns:adec="http://schemas.microsoft.com/office/drawing/2017/decorative" val="1"/>
+              </a:ext>
+            </a:extLst>
+          </p:cNvPr>
+          <p:cNvSpPr>
+            <a:spLocks noGrp="1" noRot="1" noChangeAspect="1" noMove="1" noResize="1" noEditPoints="1" noAdjustHandles="1" noChangeArrowheads="1" noChangeShapeType="1" noTextEdit="1"/>
+          </p:cNvSpPr>
+          <p:nvPr>
+            <p:extLst>
+              <p:ext uri="{386F3935-93C4-4BCD-93E2-E3B085C9AB24}">
+                <p16:designElem xmlns:p16="http://schemas.microsoft.com/office/powerpoint/2015/main" val="1"/>
+              </p:ext>
+            </p:extLst>
+          </p:nvPr>
+        </p:nvSpPr>
+        <p:spPr>
+          <a:xfrm>
+            <a:off x="0" y="0"/>
+            <a:ext cx="12192000" cy="6858000"/>
+          </a:xfrm>
+          <a:prstGeom prst="rect">
+            <a:avLst/>
+          </a:prstGeom>
+          <a:ln>
+            <a:noFill/>
+          </a:ln>
+        </p:spPr>
+        <p:style>
+          <a:lnRef idx="2">
+            <a:schemeClr val="accent1">
+              <a:shade val="50000"/>
+            </a:schemeClr>
+          </a:lnRef>
+          <a:fillRef idx="1">
+            <a:schemeClr val="accent1"/>
+          </a:fillRef>
+          <a:effectRef idx="0">
+            <a:schemeClr val="accent1"/>
+          </a:effectRef>
+          <a:fontRef idx="minor">
+            <a:schemeClr val="lt1"/>
+          </a:fontRef>
+        </p:style>
+        <p:txBody>
+          <a:bodyPr rtlCol="0" anchor="ctr"/>
+          <a:lstStyle/>
+          <a:p>
+            <a:pPr algn="ctr"/>
+            <a:endParaRPr lang="en-US"/>
+          </a:p>
+        </p:txBody>
+      </p:sp>
+      <p:sp>
+        <p:nvSpPr>
+          <p:cNvPr id="2" name="Title 1">
+            <a:extLst>
+              <a:ext uri="{FF2B5EF4-FFF2-40B4-BE49-F238E27FC236}">
+                <a16:creationId xmlns:a16="http://schemas.microsoft.com/office/drawing/2014/main" id="{86303964-F6FE-4868-9CC2-074D1EF77090}"/>
+              </a:ext>
+            </a:extLst>
+          </p:cNvPr>
+          <p:cNvSpPr>
+            <a:spLocks noGrp="1"/>
+          </p:cNvSpPr>
+          <p:nvPr>
+            <p:ph type="title"/>
+          </p:nvPr>
+        </p:nvSpPr>
+        <p:spPr>
+          <a:xfrm>
+            <a:off x="913796" y="927100"/>
+            <a:ext cx="3418766" cy="4616450"/>
+          </a:xfrm>
+        </p:spPr>
+        <p:txBody>
+          <a:bodyPr>
+            <a:normAutofit/>
+          </a:bodyPr>
+          <a:lstStyle/>
+          <a:p>
+            <a:r>
+              <a:rPr lang="en-GB" dirty="0"/>
+              <a:t>SQL Queries 2</a:t>
+            </a:r>
+          </a:p>
+        </p:txBody>
+      </p:sp>
+      <p:cxnSp>
+        <p:nvCxnSpPr>
+          <p:cNvPr id="10" name="Straight Connector 9">
+            <a:extLst>
+              <a:ext uri="{FF2B5EF4-FFF2-40B4-BE49-F238E27FC236}">
+                <a16:creationId xmlns:a16="http://schemas.microsoft.com/office/drawing/2014/main" id="{744251C3-E720-4363-8AF0-20AD319374F0}"/>
+              </a:ext>
+              <a:ext uri="{C183D7F6-B498-43B3-948B-1728B52AA6E4}">
+                <adec:decorative xmlns:adec="http://schemas.microsoft.com/office/drawing/2017/decorative" val="1"/>
+              </a:ext>
+            </a:extLst>
+          </p:cNvPr>
+          <p:cNvCxnSpPr>
+            <a:cxnSpLocks noGrp="1" noRot="1" noChangeAspect="1" noMove="1" noResize="1" noEditPoints="1" noAdjustHandles="1" noChangeArrowheads="1" noChangeShapeType="1"/>
+          </p:cNvCxnSpPr>
+          <p:nvPr>
+            <p:extLst>
+              <p:ext uri="{386F3935-93C4-4BCD-93E2-E3B085C9AB24}">
+                <p16:designElem xmlns:p16="http://schemas.microsoft.com/office/powerpoint/2015/main" val="1"/>
+              </p:ext>
+            </p:extLst>
+          </p:nvPr>
+        </p:nvCxnSpPr>
+        <p:spPr>
+          <a:xfrm>
+            <a:off x="4654296" y="2301359"/>
+            <a:ext cx="0" cy="1911350"/>
+          </a:xfrm>
+          <a:prstGeom prst="line">
+            <a:avLst/>
+          </a:prstGeom>
+          <a:ln>
+            <a:solidFill>
+              <a:schemeClr val="tx2"/>
+            </a:solidFill>
+          </a:ln>
+        </p:spPr>
+        <p:style>
+          <a:lnRef idx="1">
+            <a:schemeClr val="accent1"/>
+          </a:lnRef>
+          <a:fillRef idx="0">
+            <a:schemeClr val="accent1"/>
+          </a:fillRef>
+          <a:effectRef idx="0">
+            <a:schemeClr val="accent1"/>
+          </a:effectRef>
+          <a:fontRef idx="minor">
+            <a:schemeClr val="tx1"/>
+          </a:fontRef>
+        </p:style>
+      </p:cxnSp>
+      <p:sp>
+        <p:nvSpPr>
+          <p:cNvPr id="3" name="Content Placeholder 2">
+            <a:extLst>
+              <a:ext uri="{FF2B5EF4-FFF2-40B4-BE49-F238E27FC236}">
+                <a16:creationId xmlns:a16="http://schemas.microsoft.com/office/drawing/2014/main" id="{DC900C16-142C-4B16-82BF-214B435B784E}"/>
+              </a:ext>
+            </a:extLst>
+          </p:cNvPr>
+          <p:cNvSpPr>
+            <a:spLocks noGrp="1"/>
+          </p:cNvSpPr>
+          <p:nvPr>
+            <p:ph idx="1"/>
+          </p:nvPr>
+        </p:nvSpPr>
+        <p:spPr>
+          <a:xfrm>
+            <a:off x="4976029" y="971549"/>
+            <a:ext cx="6291528" cy="4616450"/>
+          </a:xfrm>
+        </p:spPr>
+        <p:txBody>
+          <a:bodyPr anchor="ctr">
+            <a:normAutofit fontScale="92500" lnSpcReduction="10000"/>
+          </a:bodyPr>
+          <a:lstStyle/>
+          <a:p>
+            <a:pPr>
+              <a:lnSpc>
+                <a:spcPct val="110000"/>
+              </a:lnSpc>
+            </a:pPr>
+            <a:r>
+              <a:rPr lang="en-GB" sz="1600" dirty="0">
+                <a:latin typeface="+mj-lt"/>
+              </a:rPr>
+              <a:t>The Universities table contains users’ university information that was deliberately kept separate from the Users table. Again, this was due to the Normalisation and, more specifically, it was again due to the date range depending on both the user and the university (which led to the creation of a composite key). Like the Workplaces table, all of its datatypes are VARCHARs and, also alike to the Workplaces table, one foreign key is present which linked it to the Users table. The foreign key is the “</a:t>
+            </a:r>
+            <a:r>
+              <a:rPr lang="en-GB" sz="1600" dirty="0" err="1">
+                <a:latin typeface="+mj-lt"/>
+              </a:rPr>
+              <a:t>user_id</a:t>
+            </a:r>
+            <a:r>
+              <a:rPr lang="en-GB" sz="1600" dirty="0">
+                <a:latin typeface="+mj-lt"/>
+              </a:rPr>
+              <a:t>”, allowing for the table to be directly connected to the Users table.</a:t>
+            </a:r>
+          </a:p>
+          <a:p>
+            <a:pPr>
+              <a:lnSpc>
+                <a:spcPct val="110000"/>
+              </a:lnSpc>
+            </a:pPr>
+            <a:r>
+              <a:rPr lang="en-GB" sz="1600" dirty="0">
+                <a:latin typeface="+mj-lt"/>
+              </a:rPr>
+              <a:t>The User-Friend Link table can also be more simply known as the Friends table, but is not explicitly named as such due to it initially being a link between the Users table and the original Friends table. The original Friends table contained only the ID, the forename, and the surname of the friend and, because friends are themselves users, this information could easily be contained within the Users table (hence preventing duplication of data).</a:t>
+            </a:r>
+          </a:p>
+        </p:txBody>
+      </p:sp>
+    </p:spTree>
+    <p:extLst>
+      <p:ext uri="{BB962C8B-B14F-4D97-AF65-F5344CB8AC3E}">
+        <p14:creationId xmlns:p14="http://schemas.microsoft.com/office/powerpoint/2010/main" val="3126795559"/>
       </p:ext>
     </p:extLst>
   </p:cSld>
@@ -7713,4 +9008,299 @@
     </a:ext>
   </a:extLst>
 </a:theme>
+</file>
+
+<file path=ppt/theme/theme2.xml><?xml version="1.0" encoding="utf-8"?>
+<a:theme xmlns:a="http://schemas.openxmlformats.org/drawingml/2006/main" name="Office Theme">
+  <a:themeElements>
+    <a:clrScheme name="Office">
+      <a:dk1>
+        <a:sysClr val="windowText" lastClr="000000"/>
+      </a:dk1>
+      <a:lt1>
+        <a:sysClr val="window" lastClr="FFFFFF"/>
+      </a:lt1>
+      <a:dk2>
+        <a:srgbClr val="44546A"/>
+      </a:dk2>
+      <a:lt2>
+        <a:srgbClr val="E7E6E6"/>
+      </a:lt2>
+      <a:accent1>
+        <a:srgbClr val="4472C4"/>
+      </a:accent1>
+      <a:accent2>
+        <a:srgbClr val="ED7D31"/>
+      </a:accent2>
+      <a:accent3>
+        <a:srgbClr val="A5A5A5"/>
+      </a:accent3>
+      <a:accent4>
+        <a:srgbClr val="FFC000"/>
+      </a:accent4>
+      <a:accent5>
+        <a:srgbClr val="5B9BD5"/>
+      </a:accent5>
+      <a:accent6>
+        <a:srgbClr val="70AD47"/>
+      </a:accent6>
+      <a:hlink>
+        <a:srgbClr val="0563C1"/>
+      </a:hlink>
+      <a:folHlink>
+        <a:srgbClr val="954F72"/>
+      </a:folHlink>
+    </a:clrScheme>
+    <a:fontScheme name="Office">
+      <a:majorFont>
+        <a:latin typeface="Calibri Light" panose="020F0302020204030204"/>
+        <a:ea typeface=""/>
+        <a:cs typeface=""/>
+        <a:font script="Jpan" typeface="游ゴシック Light"/>
+        <a:font script="Hang" typeface="맑은 고딕"/>
+        <a:font script="Hans" typeface="等线 Light"/>
+        <a:font script="Hant" typeface="新細明體"/>
+        <a:font script="Arab" typeface="Times New Roman"/>
+        <a:font script="Hebr" typeface="Times New Roman"/>
+        <a:font script="Thai" typeface="Angsana New"/>
+        <a:font script="Ethi" typeface="Nyala"/>
+        <a:font script="Beng" typeface="Vrinda"/>
+        <a:font script="Gujr" typeface="Shruti"/>
+        <a:font script="Khmr" typeface="MoolBoran"/>
+        <a:font script="Knda" typeface="Tunga"/>
+        <a:font script="Guru" typeface="Raavi"/>
+        <a:font script="Cans" typeface="Euphemia"/>
+        <a:font script="Cher" typeface="Plantagenet Cherokee"/>
+        <a:font script="Yiii" typeface="Microsoft Yi Baiti"/>
+        <a:font script="Tibt" typeface="Microsoft Himalaya"/>
+        <a:font script="Thaa" typeface="MV Boli"/>
+        <a:font script="Deva" typeface="Mangal"/>
+        <a:font script="Telu" typeface="Gautami"/>
+        <a:font script="Taml" typeface="Latha"/>
+        <a:font script="Syrc" typeface="Estrangelo Edessa"/>
+        <a:font script="Orya" typeface="Kalinga"/>
+        <a:font script="Mlym" typeface="Kartika"/>
+        <a:font script="Laoo" typeface="DokChampa"/>
+        <a:font script="Sinh" typeface="Iskoola Pota"/>
+        <a:font script="Mong" typeface="Mongolian Baiti"/>
+        <a:font script="Viet" typeface="Times New Roman"/>
+        <a:font script="Uigh" typeface="Microsoft Uighur"/>
+        <a:font script="Geor" typeface="Sylfaen"/>
+        <a:font script="Armn" typeface="Arial"/>
+        <a:font script="Bugi" typeface="Leelawadee UI"/>
+        <a:font script="Bopo" typeface="Microsoft JhengHei"/>
+        <a:font script="Java" typeface="Javanese Text"/>
+        <a:font script="Lisu" typeface="Segoe UI"/>
+        <a:font script="Mymr" typeface="Myanmar Text"/>
+        <a:font script="Nkoo" typeface="Ebrima"/>
+        <a:font script="Olck" typeface="Nirmala UI"/>
+        <a:font script="Osma" typeface="Ebrima"/>
+        <a:font script="Phag" typeface="Phagspa"/>
+        <a:font script="Syrn" typeface="Estrangelo Edessa"/>
+        <a:font script="Syrj" typeface="Estrangelo Edessa"/>
+        <a:font script="Syre" typeface="Estrangelo Edessa"/>
+        <a:font script="Sora" typeface="Nirmala UI"/>
+        <a:font script="Tale" typeface="Microsoft Tai Le"/>
+        <a:font script="Talu" typeface="Microsoft New Tai Lue"/>
+        <a:font script="Tfng" typeface="Ebrima"/>
+      </a:majorFont>
+      <a:minorFont>
+        <a:latin typeface="Calibri" panose="020F0502020204030204"/>
+        <a:ea typeface=""/>
+        <a:cs typeface=""/>
+        <a:font script="Jpan" typeface="游ゴシック"/>
+        <a:font script="Hang" typeface="맑은 고딕"/>
+        <a:font script="Hans" typeface="等线"/>
+        <a:font script="Hant" typeface="新細明體"/>
+        <a:font script="Arab" typeface="Arial"/>
+        <a:font script="Hebr" typeface="Arial"/>
+        <a:font script="Thai" typeface="Cordia New"/>
+        <a:font script="Ethi" typeface="Nyala"/>
+        <a:font script="Beng" typeface="Vrinda"/>
+        <a:font script="Gujr" typeface="Shruti"/>
+        <a:font script="Khmr" typeface="DaunPenh"/>
+        <a:font script="Knda" typeface="Tunga"/>
+        <a:font script="Guru" typeface="Raavi"/>
+        <a:font script="Cans" typeface="Euphemia"/>
+        <a:font script="Cher" typeface="Plantagenet Cherokee"/>
+        <a:font script="Yiii" typeface="Microsoft Yi Baiti"/>
+        <a:font script="Tibt" typeface="Microsoft Himalaya"/>
+        <a:font script="Thaa" typeface="MV Boli"/>
+        <a:font script="Deva" typeface="Mangal"/>
+        <a:font script="Telu" typeface="Gautami"/>
+        <a:font script="Taml" typeface="Latha"/>
+        <a:font script="Syrc" typeface="Estrangelo Edessa"/>
+        <a:font script="Orya" typeface="Kalinga"/>
+        <a:font script="Mlym" typeface="Kartika"/>
+        <a:font script="Laoo" typeface="DokChampa"/>
+        <a:font script="Sinh" typeface="Iskoola Pota"/>
+        <a:font script="Mong" typeface="Mongolian Baiti"/>
+        <a:font script="Viet" typeface="Arial"/>
+        <a:font script="Uigh" typeface="Microsoft Uighur"/>
+        <a:font script="Geor" typeface="Sylfaen"/>
+        <a:font script="Armn" typeface="Arial"/>
+        <a:font script="Bugi" typeface="Leelawadee UI"/>
+        <a:font script="Bopo" typeface="Microsoft JhengHei"/>
+        <a:font script="Java" typeface="Javanese Text"/>
+        <a:font script="Lisu" typeface="Segoe UI"/>
+        <a:font script="Mymr" typeface="Myanmar Text"/>
+        <a:font script="Nkoo" typeface="Ebrima"/>
+        <a:font script="Olck" typeface="Nirmala UI"/>
+        <a:font script="Osma" typeface="Ebrima"/>
+        <a:font script="Phag" typeface="Phagspa"/>
+        <a:font script="Syrn" typeface="Estrangelo Edessa"/>
+        <a:font script="Syrj" typeface="Estrangelo Edessa"/>
+        <a:font script="Syre" typeface="Estrangelo Edessa"/>
+        <a:font script="Sora" typeface="Nirmala UI"/>
+        <a:font script="Tale" typeface="Microsoft Tai Le"/>
+        <a:font script="Talu" typeface="Microsoft New Tai Lue"/>
+        <a:font script="Tfng" typeface="Ebrima"/>
+      </a:minorFont>
+    </a:fontScheme>
+    <a:fmtScheme name="Office">
+      <a:fillStyleLst>
+        <a:solidFill>
+          <a:schemeClr val="phClr"/>
+        </a:solidFill>
+        <a:gradFill rotWithShape="1">
+          <a:gsLst>
+            <a:gs pos="0">
+              <a:schemeClr val="phClr">
+                <a:lumMod val="110000"/>
+                <a:satMod val="105000"/>
+                <a:tint val="67000"/>
+              </a:schemeClr>
+            </a:gs>
+            <a:gs pos="50000">
+              <a:schemeClr val="phClr">
+                <a:lumMod val="105000"/>
+                <a:satMod val="103000"/>
+                <a:tint val="73000"/>
+              </a:schemeClr>
+            </a:gs>
+            <a:gs pos="100000">
+              <a:schemeClr val="phClr">
+                <a:lumMod val="105000"/>
+                <a:satMod val="109000"/>
+                <a:tint val="81000"/>
+              </a:schemeClr>
+            </a:gs>
+          </a:gsLst>
+          <a:lin ang="5400000" scaled="0"/>
+        </a:gradFill>
+        <a:gradFill rotWithShape="1">
+          <a:gsLst>
+            <a:gs pos="0">
+              <a:schemeClr val="phClr">
+                <a:satMod val="103000"/>
+                <a:lumMod val="102000"/>
+                <a:tint val="94000"/>
+              </a:schemeClr>
+            </a:gs>
+            <a:gs pos="50000">
+              <a:schemeClr val="phClr">
+                <a:satMod val="110000"/>
+                <a:lumMod val="100000"/>
+                <a:shade val="100000"/>
+              </a:schemeClr>
+            </a:gs>
+            <a:gs pos="100000">
+              <a:schemeClr val="phClr">
+                <a:lumMod val="99000"/>
+                <a:satMod val="120000"/>
+                <a:shade val="78000"/>
+              </a:schemeClr>
+            </a:gs>
+          </a:gsLst>
+          <a:lin ang="5400000" scaled="0"/>
+        </a:gradFill>
+      </a:fillStyleLst>
+      <a:lnStyleLst>
+        <a:ln w="6350" cap="flat" cmpd="sng" algn="ctr">
+          <a:solidFill>
+            <a:schemeClr val="phClr"/>
+          </a:solidFill>
+          <a:prstDash val="solid"/>
+          <a:miter lim="800000"/>
+        </a:ln>
+        <a:ln w="12700" cap="flat" cmpd="sng" algn="ctr">
+          <a:solidFill>
+            <a:schemeClr val="phClr"/>
+          </a:solidFill>
+          <a:prstDash val="solid"/>
+          <a:miter lim="800000"/>
+        </a:ln>
+        <a:ln w="19050" cap="flat" cmpd="sng" algn="ctr">
+          <a:solidFill>
+            <a:schemeClr val="phClr"/>
+          </a:solidFill>
+          <a:prstDash val="solid"/>
+          <a:miter lim="800000"/>
+        </a:ln>
+      </a:lnStyleLst>
+      <a:effectStyleLst>
+        <a:effectStyle>
+          <a:effectLst/>
+        </a:effectStyle>
+        <a:effectStyle>
+          <a:effectLst/>
+        </a:effectStyle>
+        <a:effectStyle>
+          <a:effectLst>
+            <a:outerShdw blurRad="57150" dist="19050" dir="5400000" algn="ctr" rotWithShape="0">
+              <a:srgbClr val="000000">
+                <a:alpha val="63000"/>
+              </a:srgbClr>
+            </a:outerShdw>
+          </a:effectLst>
+        </a:effectStyle>
+      </a:effectStyleLst>
+      <a:bgFillStyleLst>
+        <a:solidFill>
+          <a:schemeClr val="phClr"/>
+        </a:solidFill>
+        <a:solidFill>
+          <a:schemeClr val="phClr">
+            <a:tint val="95000"/>
+            <a:satMod val="170000"/>
+          </a:schemeClr>
+        </a:solidFill>
+        <a:gradFill rotWithShape="1">
+          <a:gsLst>
+            <a:gs pos="0">
+              <a:schemeClr val="phClr">
+                <a:tint val="93000"/>
+                <a:satMod val="150000"/>
+                <a:shade val="98000"/>
+                <a:lumMod val="102000"/>
+              </a:schemeClr>
+            </a:gs>
+            <a:gs pos="50000">
+              <a:schemeClr val="phClr">
+                <a:tint val="98000"/>
+                <a:satMod val="130000"/>
+                <a:shade val="90000"/>
+                <a:lumMod val="103000"/>
+              </a:schemeClr>
+            </a:gs>
+            <a:gs pos="100000">
+              <a:schemeClr val="phClr">
+                <a:shade val="63000"/>
+                <a:satMod val="120000"/>
+              </a:schemeClr>
+            </a:gs>
+          </a:gsLst>
+          <a:lin ang="5400000" scaled="0"/>
+        </a:gradFill>
+      </a:bgFillStyleLst>
+    </a:fmtScheme>
+  </a:themeElements>
+  <a:objectDefaults/>
+  <a:extraClrSchemeLst/>
+  <a:extLst>
+    <a:ext uri="{05A4C25C-085E-4340-85A3-A5531E510DB2}">
+      <thm15:themeFamily xmlns:thm15="http://schemas.microsoft.com/office/thememl/2012/main" name="Office Theme" id="{62F939B6-93AF-4DB8-9C6B-D6C7DFDC589F}" vid="{4A3C46E8-61CC-4603-A589-7422A47A8E4A}"/>
+    </a:ext>
+  </a:extLst>
+</a:theme>
 </file>
</xml_diff>